<commit_message>
update doc and add figure
</commit_message>
<xml_diff>
--- a/docs/ProbabilisticDiffusionModelsFigures.pptx
+++ b/docs/ProbabilisticDiffusionModelsFigures.pptx
@@ -4896,6 +4896,1569 @@
           </mc:Fallback>
         </mc:AlternateContent>
       </p:grpSp>
+      <p:sp>
+        <p:nvSpPr>
+          <p:cNvPr id="36" name="Oval 35">
+            <a:extLst>
+              <a:ext uri="{FF2B5EF4-FFF2-40B4-BE49-F238E27FC236}">
+                <a16:creationId xmlns:a16="http://schemas.microsoft.com/office/drawing/2014/main" id="{AB43CEC8-418E-B71F-C19D-6E075DF237A2}"/>
+              </a:ext>
+            </a:extLst>
+          </p:cNvPr>
+          <p:cNvSpPr/>
+          <p:nvPr/>
+        </p:nvSpPr>
+        <p:spPr>
+          <a:xfrm>
+            <a:off x="7888633" y="4313909"/>
+            <a:ext cx="264314" cy="281011"/>
+          </a:xfrm>
+          <a:prstGeom prst="ellipse">
+            <a:avLst/>
+          </a:prstGeom>
+          <a:solidFill>
+            <a:schemeClr val="accent1">
+              <a:alpha val="26901"/>
+            </a:schemeClr>
+          </a:solidFill>
+        </p:spPr>
+        <p:style>
+          <a:lnRef idx="2">
+            <a:schemeClr val="accent1">
+              <a:shade val="15000"/>
+            </a:schemeClr>
+          </a:lnRef>
+          <a:fillRef idx="1">
+            <a:schemeClr val="accent1"/>
+          </a:fillRef>
+          <a:effectRef idx="0">
+            <a:schemeClr val="accent1"/>
+          </a:effectRef>
+          <a:fontRef idx="minor">
+            <a:schemeClr val="lt1"/>
+          </a:fontRef>
+        </p:style>
+        <p:txBody>
+          <a:bodyPr rtlCol="0" anchor="ctr"/>
+          <a:lstStyle/>
+          <a:p>
+            <a:pPr algn="ctr"/>
+            <a:endParaRPr lang="en-US"/>
+          </a:p>
+        </p:txBody>
+      </p:sp>
+      <p:sp>
+        <p:nvSpPr>
+          <p:cNvPr id="37" name="Oval 36">
+            <a:extLst>
+              <a:ext uri="{FF2B5EF4-FFF2-40B4-BE49-F238E27FC236}">
+                <a16:creationId xmlns:a16="http://schemas.microsoft.com/office/drawing/2014/main" id="{105B5CC7-4471-7AEC-567E-B6CD644DD984}"/>
+              </a:ext>
+            </a:extLst>
+          </p:cNvPr>
+          <p:cNvSpPr/>
+          <p:nvPr/>
+        </p:nvSpPr>
+        <p:spPr>
+          <a:xfrm>
+            <a:off x="7011123" y="4313909"/>
+            <a:ext cx="264314" cy="281011"/>
+          </a:xfrm>
+          <a:prstGeom prst="ellipse">
+            <a:avLst/>
+          </a:prstGeom>
+          <a:solidFill>
+            <a:schemeClr val="accent1">
+              <a:alpha val="26901"/>
+            </a:schemeClr>
+          </a:solidFill>
+        </p:spPr>
+        <p:style>
+          <a:lnRef idx="2">
+            <a:schemeClr val="accent1">
+              <a:shade val="15000"/>
+            </a:schemeClr>
+          </a:lnRef>
+          <a:fillRef idx="1">
+            <a:schemeClr val="accent1"/>
+          </a:fillRef>
+          <a:effectRef idx="0">
+            <a:schemeClr val="accent1"/>
+          </a:effectRef>
+          <a:fontRef idx="minor">
+            <a:schemeClr val="lt1"/>
+          </a:fontRef>
+        </p:style>
+        <p:txBody>
+          <a:bodyPr rtlCol="0" anchor="ctr"/>
+          <a:lstStyle/>
+          <a:p>
+            <a:pPr algn="ctr"/>
+            <a:endParaRPr lang="en-US"/>
+          </a:p>
+        </p:txBody>
+      </p:sp>
+      <p:sp>
+        <p:nvSpPr>
+          <p:cNvPr id="38" name="Oval 37">
+            <a:extLst>
+              <a:ext uri="{FF2B5EF4-FFF2-40B4-BE49-F238E27FC236}">
+                <a16:creationId xmlns:a16="http://schemas.microsoft.com/office/drawing/2014/main" id="{5C2C7084-3C60-CDDA-7BAA-2FF979587DC1}"/>
+              </a:ext>
+            </a:extLst>
+          </p:cNvPr>
+          <p:cNvSpPr/>
+          <p:nvPr/>
+        </p:nvSpPr>
+        <p:spPr>
+          <a:xfrm>
+            <a:off x="6161908" y="4307224"/>
+            <a:ext cx="264314" cy="281011"/>
+          </a:xfrm>
+          <a:prstGeom prst="ellipse">
+            <a:avLst/>
+          </a:prstGeom>
+          <a:solidFill>
+            <a:schemeClr val="accent1">
+              <a:alpha val="26901"/>
+            </a:schemeClr>
+          </a:solidFill>
+        </p:spPr>
+        <p:style>
+          <a:lnRef idx="2">
+            <a:schemeClr val="accent1">
+              <a:shade val="15000"/>
+            </a:schemeClr>
+          </a:lnRef>
+          <a:fillRef idx="1">
+            <a:schemeClr val="accent1"/>
+          </a:fillRef>
+          <a:effectRef idx="0">
+            <a:schemeClr val="accent1"/>
+          </a:effectRef>
+          <a:fontRef idx="minor">
+            <a:schemeClr val="lt1"/>
+          </a:fontRef>
+        </p:style>
+        <p:txBody>
+          <a:bodyPr rtlCol="0" anchor="ctr"/>
+          <a:lstStyle/>
+          <a:p>
+            <a:pPr algn="ctr"/>
+            <a:endParaRPr lang="en-US"/>
+          </a:p>
+        </p:txBody>
+      </p:sp>
+      <p:sp>
+        <p:nvSpPr>
+          <p:cNvPr id="40" name="Oval 39">
+            <a:extLst>
+              <a:ext uri="{FF2B5EF4-FFF2-40B4-BE49-F238E27FC236}">
+                <a16:creationId xmlns:a16="http://schemas.microsoft.com/office/drawing/2014/main" id="{B8D7F460-DD9A-4EC3-411D-2D84C196427E}"/>
+              </a:ext>
+            </a:extLst>
+          </p:cNvPr>
+          <p:cNvSpPr/>
+          <p:nvPr/>
+        </p:nvSpPr>
+        <p:spPr>
+          <a:xfrm>
+            <a:off x="4804978" y="4308123"/>
+            <a:ext cx="264314" cy="281011"/>
+          </a:xfrm>
+          <a:prstGeom prst="ellipse">
+            <a:avLst/>
+          </a:prstGeom>
+          <a:solidFill>
+            <a:schemeClr val="accent1">
+              <a:alpha val="26901"/>
+            </a:schemeClr>
+          </a:solidFill>
+        </p:spPr>
+        <p:style>
+          <a:lnRef idx="2">
+            <a:schemeClr val="accent1">
+              <a:shade val="15000"/>
+            </a:schemeClr>
+          </a:lnRef>
+          <a:fillRef idx="1">
+            <a:schemeClr val="accent1"/>
+          </a:fillRef>
+          <a:effectRef idx="0">
+            <a:schemeClr val="accent1"/>
+          </a:effectRef>
+          <a:fontRef idx="minor">
+            <a:schemeClr val="lt1"/>
+          </a:fontRef>
+        </p:style>
+        <p:txBody>
+          <a:bodyPr rtlCol="0" anchor="ctr"/>
+          <a:lstStyle/>
+          <a:p>
+            <a:pPr algn="ctr"/>
+            <a:endParaRPr lang="en-US"/>
+          </a:p>
+        </p:txBody>
+      </p:sp>
+      <mc:AlternateContent xmlns:mc="http://schemas.openxmlformats.org/markup-compatibility/2006">
+        <mc:Choice xmlns:a14="http://schemas.microsoft.com/office/drawing/2010/main" Requires="a14">
+          <p:sp>
+            <p:nvSpPr>
+              <p:cNvPr id="41" name="TextBox 40">
+                <a:extLst>
+                  <a:ext uri="{FF2B5EF4-FFF2-40B4-BE49-F238E27FC236}">
+                    <a16:creationId xmlns:a16="http://schemas.microsoft.com/office/drawing/2014/main" id="{5C32AE48-A9EF-591B-BB1D-10D7DCC3135E}"/>
+                  </a:ext>
+                </a:extLst>
+              </p:cNvPr>
+              <p:cNvSpPr txBox="1"/>
+              <p:nvPr/>
+            </p:nvSpPr>
+            <p:spPr>
+              <a:xfrm>
+                <a:off x="4773623" y="4307229"/>
+                <a:ext cx="337657" cy="230832"/>
+              </a:xfrm>
+              <a:prstGeom prst="rect">
+                <a:avLst/>
+              </a:prstGeom>
+              <a:noFill/>
+            </p:spPr>
+            <p:txBody>
+              <a:bodyPr wrap="none" rtlCol="0">
+                <a:spAutoFit/>
+              </a:bodyPr>
+              <a:lstStyle/>
+              <a:p>
+                <a14:m>
+                  <m:oMathPara xmlns:m="http://schemas.openxmlformats.org/officeDocument/2006/math">
+                    <m:oMathParaPr>
+                      <m:jc m:val="centerGroup"/>
+                    </m:oMathParaPr>
+                    <m:oMath xmlns:m="http://schemas.openxmlformats.org/officeDocument/2006/math">
+                      <m:sSub>
+                        <m:sSubPr>
+                          <m:ctrlPr>
+                            <a:rPr lang="en-US" sz="900" i="1" smtClean="0">
+                              <a:latin typeface="Cambria Math" panose="02040503050406030204" pitchFamily="18" charset="0"/>
+                            </a:rPr>
+                          </m:ctrlPr>
+                        </m:sSubPr>
+                        <m:e>
+                          <m:r>
+                            <a:rPr lang="en-US" sz="900" b="1" i="0" smtClean="0">
+                              <a:latin typeface="Cambria Math" panose="02040503050406030204" pitchFamily="18" charset="0"/>
+                            </a:rPr>
+                            <m:t>𝐱</m:t>
+                          </m:r>
+                        </m:e>
+                        <m:sub>
+                          <m:r>
+                            <a:rPr lang="en-US" sz="900" b="0" i="1" smtClean="0">
+                              <a:latin typeface="Cambria Math" panose="02040503050406030204" pitchFamily="18" charset="0"/>
+                            </a:rPr>
+                            <m:t>𝑇</m:t>
+                          </m:r>
+                        </m:sub>
+                      </m:sSub>
+                    </m:oMath>
+                  </m:oMathPara>
+                </a14:m>
+                <a:endParaRPr lang="en-US" sz="900" dirty="0"/>
+              </a:p>
+            </p:txBody>
+          </p:sp>
+        </mc:Choice>
+        <mc:Fallback>
+          <p:sp>
+            <p:nvSpPr>
+              <p:cNvPr id="41" name="TextBox 40">
+                <a:extLst>
+                  <a:ext uri="{FF2B5EF4-FFF2-40B4-BE49-F238E27FC236}">
+                    <a16:creationId xmlns:a16="http://schemas.microsoft.com/office/drawing/2014/main" id="{5C32AE48-A9EF-591B-BB1D-10D7DCC3135E}"/>
+                  </a:ext>
+                </a:extLst>
+              </p:cNvPr>
+              <p:cNvSpPr txBox="1">
+                <a:spLocks noRot="1" noChangeAspect="1" noMove="1" noResize="1" noEditPoints="1" noAdjustHandles="1" noChangeArrowheads="1" noChangeShapeType="1" noTextEdit="1"/>
+              </p:cNvSpPr>
+              <p:nvPr/>
+            </p:nvSpPr>
+            <p:spPr>
+              <a:xfrm>
+                <a:off x="4773623" y="4307229"/>
+                <a:ext cx="337657" cy="230832"/>
+              </a:xfrm>
+              <a:prstGeom prst="rect">
+                <a:avLst/>
+              </a:prstGeom>
+              <a:blipFill>
+                <a:blip r:embed="rId13"/>
+                <a:stretch>
+                  <a:fillRect/>
+                </a:stretch>
+              </a:blipFill>
+            </p:spPr>
+            <p:txBody>
+              <a:bodyPr/>
+              <a:lstStyle/>
+              <a:p>
+                <a:r>
+                  <a:rPr lang="en-US">
+                    <a:noFill/>
+                  </a:rPr>
+                  <a:t> </a:t>
+                </a:r>
+              </a:p>
+            </p:txBody>
+          </p:sp>
+        </mc:Fallback>
+      </mc:AlternateContent>
+      <mc:AlternateContent xmlns:mc="http://schemas.openxmlformats.org/markup-compatibility/2006">
+        <mc:Choice xmlns:a14="http://schemas.microsoft.com/office/drawing/2010/main" Requires="a14">
+          <p:sp>
+            <p:nvSpPr>
+              <p:cNvPr id="43" name="TextBox 42">
+                <a:extLst>
+                  <a:ext uri="{FF2B5EF4-FFF2-40B4-BE49-F238E27FC236}">
+                    <a16:creationId xmlns:a16="http://schemas.microsoft.com/office/drawing/2014/main" id="{8092DF36-C43B-0BE3-C38C-41636F1E3C9C}"/>
+                  </a:ext>
+                </a:extLst>
+              </p:cNvPr>
+              <p:cNvSpPr txBox="1"/>
+              <p:nvPr/>
+            </p:nvSpPr>
+            <p:spPr>
+              <a:xfrm>
+                <a:off x="6141506" y="4307227"/>
+                <a:ext cx="318805" cy="230832"/>
+              </a:xfrm>
+              <a:prstGeom prst="rect">
+                <a:avLst/>
+              </a:prstGeom>
+              <a:noFill/>
+            </p:spPr>
+            <p:txBody>
+              <a:bodyPr wrap="none" rtlCol="0">
+                <a:spAutoFit/>
+              </a:bodyPr>
+              <a:lstStyle/>
+              <a:p>
+                <a14:m>
+                  <m:oMathPara xmlns:m="http://schemas.openxmlformats.org/officeDocument/2006/math">
+                    <m:oMathParaPr>
+                      <m:jc m:val="centerGroup"/>
+                    </m:oMathParaPr>
+                    <m:oMath xmlns:m="http://schemas.openxmlformats.org/officeDocument/2006/math">
+                      <m:sSub>
+                        <m:sSubPr>
+                          <m:ctrlPr>
+                            <a:rPr lang="en-US" sz="900" i="1" smtClean="0">
+                              <a:latin typeface="Cambria Math" panose="02040503050406030204" pitchFamily="18" charset="0"/>
+                            </a:rPr>
+                          </m:ctrlPr>
+                        </m:sSubPr>
+                        <m:e>
+                          <m:r>
+                            <a:rPr lang="en-US" sz="900" b="1" i="0" smtClean="0">
+                              <a:latin typeface="Cambria Math" panose="02040503050406030204" pitchFamily="18" charset="0"/>
+                            </a:rPr>
+                            <m:t>𝐱</m:t>
+                          </m:r>
+                        </m:e>
+                        <m:sub>
+                          <m:r>
+                            <a:rPr lang="en-US" sz="900" b="0" i="1" smtClean="0">
+                              <a:latin typeface="Cambria Math" panose="02040503050406030204" pitchFamily="18" charset="0"/>
+                            </a:rPr>
+                            <m:t>𝑡</m:t>
+                          </m:r>
+                        </m:sub>
+                      </m:sSub>
+                    </m:oMath>
+                  </m:oMathPara>
+                </a14:m>
+                <a:endParaRPr lang="en-US" sz="900" dirty="0"/>
+              </a:p>
+            </p:txBody>
+          </p:sp>
+        </mc:Choice>
+        <mc:Fallback>
+          <p:sp>
+            <p:nvSpPr>
+              <p:cNvPr id="43" name="TextBox 42">
+                <a:extLst>
+                  <a:ext uri="{FF2B5EF4-FFF2-40B4-BE49-F238E27FC236}">
+                    <a16:creationId xmlns:a16="http://schemas.microsoft.com/office/drawing/2014/main" id="{8092DF36-C43B-0BE3-C38C-41636F1E3C9C}"/>
+                  </a:ext>
+                </a:extLst>
+              </p:cNvPr>
+              <p:cNvSpPr txBox="1">
+                <a:spLocks noRot="1" noChangeAspect="1" noMove="1" noResize="1" noEditPoints="1" noAdjustHandles="1" noChangeArrowheads="1" noChangeShapeType="1" noTextEdit="1"/>
+              </p:cNvSpPr>
+              <p:nvPr/>
+            </p:nvSpPr>
+            <p:spPr>
+              <a:xfrm>
+                <a:off x="6141506" y="4307227"/>
+                <a:ext cx="318805" cy="230832"/>
+              </a:xfrm>
+              <a:prstGeom prst="rect">
+                <a:avLst/>
+              </a:prstGeom>
+              <a:blipFill>
+                <a:blip r:embed="rId14"/>
+                <a:stretch>
+                  <a:fillRect/>
+                </a:stretch>
+              </a:blipFill>
+            </p:spPr>
+            <p:txBody>
+              <a:bodyPr/>
+              <a:lstStyle/>
+              <a:p>
+                <a:r>
+                  <a:rPr lang="en-US">
+                    <a:noFill/>
+                  </a:rPr>
+                  <a:t> </a:t>
+                </a:r>
+              </a:p>
+            </p:txBody>
+          </p:sp>
+        </mc:Fallback>
+      </mc:AlternateContent>
+      <mc:AlternateContent xmlns:mc="http://schemas.openxmlformats.org/markup-compatibility/2006">
+        <mc:Choice xmlns:a14="http://schemas.microsoft.com/office/drawing/2010/main" Requires="a14">
+          <p:sp>
+            <p:nvSpPr>
+              <p:cNvPr id="44" name="TextBox 43">
+                <a:extLst>
+                  <a:ext uri="{FF2B5EF4-FFF2-40B4-BE49-F238E27FC236}">
+                    <a16:creationId xmlns:a16="http://schemas.microsoft.com/office/drawing/2014/main" id="{FD94434A-6C6B-6CE8-98D3-650C890B25FD}"/>
+                  </a:ext>
+                </a:extLst>
+              </p:cNvPr>
+              <p:cNvSpPr txBox="1"/>
+              <p:nvPr/>
+            </p:nvSpPr>
+            <p:spPr>
+              <a:xfrm>
+                <a:off x="6939076" y="4320863"/>
+                <a:ext cx="427809" cy="230832"/>
+              </a:xfrm>
+              <a:prstGeom prst="rect">
+                <a:avLst/>
+              </a:prstGeom>
+              <a:noFill/>
+            </p:spPr>
+            <p:txBody>
+              <a:bodyPr wrap="none" rtlCol="0">
+                <a:spAutoFit/>
+              </a:bodyPr>
+              <a:lstStyle/>
+              <a:p>
+                <a14:m>
+                  <m:oMathPara xmlns:m="http://schemas.openxmlformats.org/officeDocument/2006/math">
+                    <m:oMathParaPr>
+                      <m:jc m:val="centerGroup"/>
+                    </m:oMathParaPr>
+                    <m:oMath xmlns:m="http://schemas.openxmlformats.org/officeDocument/2006/math">
+                      <m:sSub>
+                        <m:sSubPr>
+                          <m:ctrlPr>
+                            <a:rPr lang="en-US" sz="900" i="1" smtClean="0">
+                              <a:latin typeface="Cambria Math" panose="02040503050406030204" pitchFamily="18" charset="0"/>
+                            </a:rPr>
+                          </m:ctrlPr>
+                        </m:sSubPr>
+                        <m:e>
+                          <m:r>
+                            <a:rPr lang="en-US" sz="900" b="1" i="0" smtClean="0">
+                              <a:latin typeface="Cambria Math" panose="02040503050406030204" pitchFamily="18" charset="0"/>
+                            </a:rPr>
+                            <m:t>𝐱</m:t>
+                          </m:r>
+                        </m:e>
+                        <m:sub>
+                          <m:r>
+                            <a:rPr lang="en-US" sz="900" b="0" i="1" smtClean="0">
+                              <a:latin typeface="Cambria Math" panose="02040503050406030204" pitchFamily="18" charset="0"/>
+                            </a:rPr>
+                            <m:t>𝑡</m:t>
+                          </m:r>
+                          <m:r>
+                            <a:rPr lang="en-US" sz="900" b="0" i="1" smtClean="0">
+                              <a:latin typeface="Cambria Math" panose="02040503050406030204" pitchFamily="18" charset="0"/>
+                            </a:rPr>
+                            <m:t>−1</m:t>
+                          </m:r>
+                        </m:sub>
+                      </m:sSub>
+                    </m:oMath>
+                  </m:oMathPara>
+                </a14:m>
+                <a:endParaRPr lang="en-US" sz="900" dirty="0"/>
+              </a:p>
+            </p:txBody>
+          </p:sp>
+        </mc:Choice>
+        <mc:Fallback>
+          <p:sp>
+            <p:nvSpPr>
+              <p:cNvPr id="44" name="TextBox 43">
+                <a:extLst>
+                  <a:ext uri="{FF2B5EF4-FFF2-40B4-BE49-F238E27FC236}">
+                    <a16:creationId xmlns:a16="http://schemas.microsoft.com/office/drawing/2014/main" id="{FD94434A-6C6B-6CE8-98D3-650C890B25FD}"/>
+                  </a:ext>
+                </a:extLst>
+              </p:cNvPr>
+              <p:cNvSpPr txBox="1">
+                <a:spLocks noRot="1" noChangeAspect="1" noMove="1" noResize="1" noEditPoints="1" noAdjustHandles="1" noChangeArrowheads="1" noChangeShapeType="1" noTextEdit="1"/>
+              </p:cNvSpPr>
+              <p:nvPr/>
+            </p:nvSpPr>
+            <p:spPr>
+              <a:xfrm>
+                <a:off x="6939076" y="4320863"/>
+                <a:ext cx="427809" cy="230832"/>
+              </a:xfrm>
+              <a:prstGeom prst="rect">
+                <a:avLst/>
+              </a:prstGeom>
+              <a:blipFill>
+                <a:blip r:embed="rId15"/>
+                <a:stretch>
+                  <a:fillRect/>
+                </a:stretch>
+              </a:blipFill>
+            </p:spPr>
+            <p:txBody>
+              <a:bodyPr/>
+              <a:lstStyle/>
+              <a:p>
+                <a:r>
+                  <a:rPr lang="en-US">
+                    <a:noFill/>
+                  </a:rPr>
+                  <a:t> </a:t>
+                </a:r>
+              </a:p>
+            </p:txBody>
+          </p:sp>
+        </mc:Fallback>
+      </mc:AlternateContent>
+      <mc:AlternateContent xmlns:mc="http://schemas.openxmlformats.org/markup-compatibility/2006">
+        <mc:Choice xmlns:a14="http://schemas.microsoft.com/office/drawing/2010/main" Requires="a14">
+          <p:sp>
+            <p:nvSpPr>
+              <p:cNvPr id="45" name="TextBox 44">
+                <a:extLst>
+                  <a:ext uri="{FF2B5EF4-FFF2-40B4-BE49-F238E27FC236}">
+                    <a16:creationId xmlns:a16="http://schemas.microsoft.com/office/drawing/2014/main" id="{DC588D07-8DA8-F415-82DB-E5A3EFB8164B}"/>
+                  </a:ext>
+                </a:extLst>
+              </p:cNvPr>
+              <p:cNvSpPr txBox="1"/>
+              <p:nvPr/>
+            </p:nvSpPr>
+            <p:spPr>
+              <a:xfrm>
+                <a:off x="7870653" y="4320863"/>
+                <a:ext cx="327782" cy="230832"/>
+              </a:xfrm>
+              <a:prstGeom prst="rect">
+                <a:avLst/>
+              </a:prstGeom>
+              <a:noFill/>
+            </p:spPr>
+            <p:txBody>
+              <a:bodyPr wrap="none" rtlCol="0">
+                <a:spAutoFit/>
+              </a:bodyPr>
+              <a:lstStyle/>
+              <a:p>
+                <a14:m>
+                  <m:oMathPara xmlns:m="http://schemas.openxmlformats.org/officeDocument/2006/math">
+                    <m:oMathParaPr>
+                      <m:jc m:val="centerGroup"/>
+                    </m:oMathParaPr>
+                    <m:oMath xmlns:m="http://schemas.openxmlformats.org/officeDocument/2006/math">
+                      <m:sSub>
+                        <m:sSubPr>
+                          <m:ctrlPr>
+                            <a:rPr lang="en-US" sz="900" i="1" smtClean="0">
+                              <a:latin typeface="Cambria Math" panose="02040503050406030204" pitchFamily="18" charset="0"/>
+                            </a:rPr>
+                          </m:ctrlPr>
+                        </m:sSubPr>
+                        <m:e>
+                          <m:r>
+                            <a:rPr lang="en-US" sz="900" b="1" i="0" smtClean="0">
+                              <a:latin typeface="Cambria Math" panose="02040503050406030204" pitchFamily="18" charset="0"/>
+                            </a:rPr>
+                            <m:t>𝐱</m:t>
+                          </m:r>
+                        </m:e>
+                        <m:sub>
+                          <m:r>
+                            <a:rPr lang="en-US" sz="900" b="0" i="1" smtClean="0">
+                              <a:latin typeface="Cambria Math" panose="02040503050406030204" pitchFamily="18" charset="0"/>
+                            </a:rPr>
+                            <m:t>0</m:t>
+                          </m:r>
+                        </m:sub>
+                      </m:sSub>
+                    </m:oMath>
+                  </m:oMathPara>
+                </a14:m>
+                <a:endParaRPr lang="en-US" sz="900" dirty="0"/>
+              </a:p>
+            </p:txBody>
+          </p:sp>
+        </mc:Choice>
+        <mc:Fallback>
+          <p:sp>
+            <p:nvSpPr>
+              <p:cNvPr id="45" name="TextBox 44">
+                <a:extLst>
+                  <a:ext uri="{FF2B5EF4-FFF2-40B4-BE49-F238E27FC236}">
+                    <a16:creationId xmlns:a16="http://schemas.microsoft.com/office/drawing/2014/main" id="{DC588D07-8DA8-F415-82DB-E5A3EFB8164B}"/>
+                  </a:ext>
+                </a:extLst>
+              </p:cNvPr>
+              <p:cNvSpPr txBox="1">
+                <a:spLocks noRot="1" noChangeAspect="1" noMove="1" noResize="1" noEditPoints="1" noAdjustHandles="1" noChangeArrowheads="1" noChangeShapeType="1" noTextEdit="1"/>
+              </p:cNvSpPr>
+              <p:nvPr/>
+            </p:nvSpPr>
+            <p:spPr>
+              <a:xfrm>
+                <a:off x="7870653" y="4320863"/>
+                <a:ext cx="327782" cy="230832"/>
+              </a:xfrm>
+              <a:prstGeom prst="rect">
+                <a:avLst/>
+              </a:prstGeom>
+              <a:blipFill>
+                <a:blip r:embed="rId16"/>
+                <a:stretch>
+                  <a:fillRect/>
+                </a:stretch>
+              </a:blipFill>
+            </p:spPr>
+            <p:txBody>
+              <a:bodyPr/>
+              <a:lstStyle/>
+              <a:p>
+                <a:r>
+                  <a:rPr lang="en-US">
+                    <a:noFill/>
+                  </a:rPr>
+                  <a:t> </a:t>
+                </a:r>
+              </a:p>
+            </p:txBody>
+          </p:sp>
+        </mc:Fallback>
+      </mc:AlternateContent>
+      <p:cxnSp>
+        <p:nvCxnSpPr>
+          <p:cNvPr id="46" name="Straight Arrow Connector 45">
+            <a:extLst>
+              <a:ext uri="{FF2B5EF4-FFF2-40B4-BE49-F238E27FC236}">
+                <a16:creationId xmlns:a16="http://schemas.microsoft.com/office/drawing/2014/main" id="{A3E06F7E-EE18-98E3-E00A-DF0AC0496771}"/>
+              </a:ext>
+            </a:extLst>
+          </p:cNvPr>
+          <p:cNvCxnSpPr>
+            <a:cxnSpLocks/>
+            <a:stCxn id="40" idx="6"/>
+          </p:cNvCxnSpPr>
+          <p:nvPr/>
+        </p:nvCxnSpPr>
+        <p:spPr>
+          <a:xfrm flipV="1">
+            <a:off x="5069292" y="4447731"/>
+            <a:ext cx="392750" cy="898"/>
+          </a:xfrm>
+          <a:prstGeom prst="straightConnector1">
+            <a:avLst/>
+          </a:prstGeom>
+          <a:ln>
+            <a:tailEnd type="triangle"/>
+          </a:ln>
+        </p:spPr>
+        <p:style>
+          <a:lnRef idx="1">
+            <a:schemeClr val="accent1"/>
+          </a:lnRef>
+          <a:fillRef idx="0">
+            <a:schemeClr val="accent1"/>
+          </a:fillRef>
+          <a:effectRef idx="0">
+            <a:schemeClr val="accent1"/>
+          </a:effectRef>
+          <a:fontRef idx="minor">
+            <a:schemeClr val="tx1"/>
+          </a:fontRef>
+        </p:style>
+      </p:cxnSp>
+      <p:cxnSp>
+        <p:nvCxnSpPr>
+          <p:cNvPr id="47" name="Straight Arrow Connector 46">
+            <a:extLst>
+              <a:ext uri="{FF2B5EF4-FFF2-40B4-BE49-F238E27FC236}">
+                <a16:creationId xmlns:a16="http://schemas.microsoft.com/office/drawing/2014/main" id="{CD8A18F1-5C48-AE4B-5968-7B50268AA7C5}"/>
+              </a:ext>
+            </a:extLst>
+          </p:cNvPr>
+          <p:cNvCxnSpPr>
+            <a:cxnSpLocks/>
+            <a:endCxn id="38" idx="2"/>
+          </p:cNvCxnSpPr>
+          <p:nvPr/>
+        </p:nvCxnSpPr>
+        <p:spPr>
+          <a:xfrm flipV="1">
+            <a:off x="5726356" y="4447730"/>
+            <a:ext cx="435552" cy="1"/>
+          </a:xfrm>
+          <a:prstGeom prst="straightConnector1">
+            <a:avLst/>
+          </a:prstGeom>
+          <a:ln>
+            <a:tailEnd type="triangle"/>
+          </a:ln>
+        </p:spPr>
+        <p:style>
+          <a:lnRef idx="1">
+            <a:schemeClr val="accent1"/>
+          </a:lnRef>
+          <a:fillRef idx="0">
+            <a:schemeClr val="accent1"/>
+          </a:fillRef>
+          <a:effectRef idx="0">
+            <a:schemeClr val="accent1"/>
+          </a:effectRef>
+          <a:fontRef idx="minor">
+            <a:schemeClr val="tx1"/>
+          </a:fontRef>
+        </p:style>
+      </p:cxnSp>
+      <p:cxnSp>
+        <p:nvCxnSpPr>
+          <p:cNvPr id="48" name="Straight Arrow Connector 47">
+            <a:extLst>
+              <a:ext uri="{FF2B5EF4-FFF2-40B4-BE49-F238E27FC236}">
+                <a16:creationId xmlns:a16="http://schemas.microsoft.com/office/drawing/2014/main" id="{B7A8A782-0BAA-321D-289B-960F692150B6}"/>
+              </a:ext>
+            </a:extLst>
+          </p:cNvPr>
+          <p:cNvCxnSpPr>
+            <a:stCxn id="38" idx="6"/>
+          </p:cNvCxnSpPr>
+          <p:nvPr/>
+        </p:nvCxnSpPr>
+        <p:spPr>
+          <a:xfrm flipV="1">
+            <a:off x="6426222" y="4447729"/>
+            <a:ext cx="189583" cy="1"/>
+          </a:xfrm>
+          <a:prstGeom prst="straightConnector1">
+            <a:avLst/>
+          </a:prstGeom>
+          <a:ln>
+            <a:tailEnd type="triangle"/>
+          </a:ln>
+        </p:spPr>
+        <p:style>
+          <a:lnRef idx="1">
+            <a:schemeClr val="accent1"/>
+          </a:lnRef>
+          <a:fillRef idx="0">
+            <a:schemeClr val="accent1"/>
+          </a:fillRef>
+          <a:effectRef idx="0">
+            <a:schemeClr val="accent1"/>
+          </a:effectRef>
+          <a:fontRef idx="minor">
+            <a:schemeClr val="tx1"/>
+          </a:fontRef>
+        </p:style>
+      </p:cxnSp>
+      <p:cxnSp>
+        <p:nvCxnSpPr>
+          <p:cNvPr id="49" name="Straight Arrow Connector 48">
+            <a:extLst>
+              <a:ext uri="{FF2B5EF4-FFF2-40B4-BE49-F238E27FC236}">
+                <a16:creationId xmlns:a16="http://schemas.microsoft.com/office/drawing/2014/main" id="{75D16B5F-5040-D1F2-C5C4-5F9C45457AA4}"/>
+              </a:ext>
+            </a:extLst>
+          </p:cNvPr>
+          <p:cNvCxnSpPr/>
+          <p:nvPr/>
+        </p:nvCxnSpPr>
+        <p:spPr>
+          <a:xfrm flipV="1">
+            <a:off x="6818972" y="4454414"/>
+            <a:ext cx="189583" cy="1"/>
+          </a:xfrm>
+          <a:prstGeom prst="straightConnector1">
+            <a:avLst/>
+          </a:prstGeom>
+          <a:ln>
+            <a:tailEnd type="triangle"/>
+          </a:ln>
+        </p:spPr>
+        <p:style>
+          <a:lnRef idx="1">
+            <a:schemeClr val="accent1"/>
+          </a:lnRef>
+          <a:fillRef idx="0">
+            <a:schemeClr val="accent1"/>
+          </a:fillRef>
+          <a:effectRef idx="0">
+            <a:schemeClr val="accent1"/>
+          </a:effectRef>
+          <a:fontRef idx="minor">
+            <a:schemeClr val="tx1"/>
+          </a:fontRef>
+        </p:style>
+      </p:cxnSp>
+      <p:cxnSp>
+        <p:nvCxnSpPr>
+          <p:cNvPr id="50" name="Straight Arrow Connector 49">
+            <a:extLst>
+              <a:ext uri="{FF2B5EF4-FFF2-40B4-BE49-F238E27FC236}">
+                <a16:creationId xmlns:a16="http://schemas.microsoft.com/office/drawing/2014/main" id="{BB291099-30E2-7080-7094-018801B30200}"/>
+              </a:ext>
+            </a:extLst>
+          </p:cNvPr>
+          <p:cNvCxnSpPr/>
+          <p:nvPr/>
+        </p:nvCxnSpPr>
+        <p:spPr>
+          <a:xfrm flipV="1">
+            <a:off x="7274917" y="4454414"/>
+            <a:ext cx="189583" cy="1"/>
+          </a:xfrm>
+          <a:prstGeom prst="straightConnector1">
+            <a:avLst/>
+          </a:prstGeom>
+          <a:ln>
+            <a:tailEnd type="triangle"/>
+          </a:ln>
+        </p:spPr>
+        <p:style>
+          <a:lnRef idx="1">
+            <a:schemeClr val="accent1"/>
+          </a:lnRef>
+          <a:fillRef idx="0">
+            <a:schemeClr val="accent1"/>
+          </a:fillRef>
+          <a:effectRef idx="0">
+            <a:schemeClr val="accent1"/>
+          </a:effectRef>
+          <a:fontRef idx="minor">
+            <a:schemeClr val="tx1"/>
+          </a:fontRef>
+        </p:style>
+      </p:cxnSp>
+      <p:cxnSp>
+        <p:nvCxnSpPr>
+          <p:cNvPr id="51" name="Straight Arrow Connector 50">
+            <a:extLst>
+              <a:ext uri="{FF2B5EF4-FFF2-40B4-BE49-F238E27FC236}">
+                <a16:creationId xmlns:a16="http://schemas.microsoft.com/office/drawing/2014/main" id="{62335AB4-6495-4204-BDE5-B01714DB92F9}"/>
+              </a:ext>
+            </a:extLst>
+          </p:cNvPr>
+          <p:cNvCxnSpPr/>
+          <p:nvPr/>
+        </p:nvCxnSpPr>
+        <p:spPr>
+          <a:xfrm flipV="1">
+            <a:off x="7697078" y="4454414"/>
+            <a:ext cx="189583" cy="1"/>
+          </a:xfrm>
+          <a:prstGeom prst="straightConnector1">
+            <a:avLst/>
+          </a:prstGeom>
+          <a:ln>
+            <a:tailEnd type="triangle"/>
+          </a:ln>
+        </p:spPr>
+        <p:style>
+          <a:lnRef idx="1">
+            <a:schemeClr val="accent1"/>
+          </a:lnRef>
+          <a:fillRef idx="0">
+            <a:schemeClr val="accent1"/>
+          </a:fillRef>
+          <a:effectRef idx="0">
+            <a:schemeClr val="accent1"/>
+          </a:effectRef>
+          <a:fontRef idx="minor">
+            <a:schemeClr val="tx1"/>
+          </a:fontRef>
+        </p:style>
+      </p:cxnSp>
+      <p:cxnSp>
+        <p:nvCxnSpPr>
+          <p:cNvPr id="52" name="Straight Arrow Connector 51">
+            <a:extLst>
+              <a:ext uri="{FF2B5EF4-FFF2-40B4-BE49-F238E27FC236}">
+                <a16:creationId xmlns:a16="http://schemas.microsoft.com/office/drawing/2014/main" id="{23554A77-4ACD-7DDF-CB9D-DB62B28B76EB}"/>
+              </a:ext>
+            </a:extLst>
+          </p:cNvPr>
+          <p:cNvCxnSpPr/>
+          <p:nvPr/>
+        </p:nvCxnSpPr>
+        <p:spPr>
+          <a:xfrm flipV="1">
+            <a:off x="8154920" y="4454414"/>
+            <a:ext cx="189583" cy="1"/>
+          </a:xfrm>
+          <a:prstGeom prst="straightConnector1">
+            <a:avLst/>
+          </a:prstGeom>
+          <a:ln>
+            <a:tailEnd type="triangle"/>
+          </a:ln>
+        </p:spPr>
+        <p:style>
+          <a:lnRef idx="1">
+            <a:schemeClr val="accent1"/>
+          </a:lnRef>
+          <a:fillRef idx="0">
+            <a:schemeClr val="accent1"/>
+          </a:fillRef>
+          <a:effectRef idx="0">
+            <a:schemeClr val="accent1"/>
+          </a:effectRef>
+          <a:fontRef idx="minor">
+            <a:schemeClr val="tx1"/>
+          </a:fontRef>
+        </p:style>
+      </p:cxnSp>
+      <p:pic>
+        <p:nvPicPr>
+          <p:cNvPr id="53" name="Picture 52" descr="A person with brown hair&#10;&#10;Description automatically generated">
+            <a:extLst>
+              <a:ext uri="{FF2B5EF4-FFF2-40B4-BE49-F238E27FC236}">
+                <a16:creationId xmlns:a16="http://schemas.microsoft.com/office/drawing/2014/main" id="{B0EA218C-40B7-3BE1-4CFA-338AFA71B77A}"/>
+              </a:ext>
+            </a:extLst>
+          </p:cNvPr>
+          <p:cNvPicPr>
+            <a:picLocks noChangeAspect="1"/>
+          </p:cNvPicPr>
+          <p:nvPr/>
+        </p:nvPicPr>
+        <p:blipFill>
+          <a:blip r:embed="rId7"/>
+          <a:stretch>
+            <a:fillRect/>
+          </a:stretch>
+        </p:blipFill>
+        <p:spPr>
+          <a:xfrm>
+            <a:off x="8131491" y="4581328"/>
+            <a:ext cx="421922" cy="413961"/>
+          </a:xfrm>
+          <a:prstGeom prst="rect">
+            <a:avLst/>
+          </a:prstGeom>
+        </p:spPr>
+      </p:pic>
+      <p:pic>
+        <p:nvPicPr>
+          <p:cNvPr id="54" name="Picture 53" descr="A blurry image of a person's face&#10;&#10;Description automatically generated">
+            <a:extLst>
+              <a:ext uri="{FF2B5EF4-FFF2-40B4-BE49-F238E27FC236}">
+                <a16:creationId xmlns:a16="http://schemas.microsoft.com/office/drawing/2014/main" id="{3F0E4618-AAD8-E07C-1350-15F03CC343B5}"/>
+              </a:ext>
+            </a:extLst>
+          </p:cNvPr>
+          <p:cNvPicPr>
+            <a:picLocks noChangeAspect="1"/>
+          </p:cNvPicPr>
+          <p:nvPr/>
+        </p:nvPicPr>
+        <p:blipFill>
+          <a:blip r:embed="rId8"/>
+          <a:stretch>
+            <a:fillRect/>
+          </a:stretch>
+        </p:blipFill>
+        <p:spPr>
+          <a:xfrm>
+            <a:off x="7252199" y="4594871"/>
+            <a:ext cx="409622" cy="378113"/>
+          </a:xfrm>
+          <a:prstGeom prst="rect">
+            <a:avLst/>
+          </a:prstGeom>
+        </p:spPr>
+      </p:pic>
+      <p:pic>
+        <p:nvPicPr>
+          <p:cNvPr id="55" name="Picture 54" descr="A close-up of a blue background&#10;&#10;Description automatically generated">
+            <a:extLst>
+              <a:ext uri="{FF2B5EF4-FFF2-40B4-BE49-F238E27FC236}">
+                <a16:creationId xmlns:a16="http://schemas.microsoft.com/office/drawing/2014/main" id="{E718999B-8AEC-91CC-A5DD-45006633AB90}"/>
+              </a:ext>
+            </a:extLst>
+          </p:cNvPr>
+          <p:cNvPicPr>
+            <a:picLocks noChangeAspect="1"/>
+          </p:cNvPicPr>
+          <p:nvPr/>
+        </p:nvPicPr>
+        <p:blipFill>
+          <a:blip r:embed="rId9"/>
+          <a:stretch>
+            <a:fillRect/>
+          </a:stretch>
+        </p:blipFill>
+        <p:spPr>
+          <a:xfrm>
+            <a:off x="5038682" y="4608733"/>
+            <a:ext cx="400484" cy="377815"/>
+          </a:xfrm>
+          <a:prstGeom prst="rect">
+            <a:avLst/>
+          </a:prstGeom>
+        </p:spPr>
+      </p:pic>
+      <mc:AlternateContent xmlns:mc="http://schemas.openxmlformats.org/markup-compatibility/2006">
+        <mc:Choice xmlns:a14="http://schemas.microsoft.com/office/drawing/2010/main" Requires="a14">
+          <p:sp>
+            <p:nvSpPr>
+              <p:cNvPr id="56" name="TextBox 55">
+                <a:extLst>
+                  <a:ext uri="{FF2B5EF4-FFF2-40B4-BE49-F238E27FC236}">
+                    <a16:creationId xmlns:a16="http://schemas.microsoft.com/office/drawing/2014/main" id="{57504CEF-B514-3C42-0AE0-9ECAED402709}"/>
+                  </a:ext>
+                </a:extLst>
+              </p:cNvPr>
+              <p:cNvSpPr txBox="1"/>
+              <p:nvPr/>
+            </p:nvSpPr>
+            <p:spPr>
+              <a:xfrm>
+                <a:off x="6554838" y="4317917"/>
+                <a:ext cx="324128" cy="246221"/>
+              </a:xfrm>
+              <a:prstGeom prst="rect">
+                <a:avLst/>
+              </a:prstGeom>
+              <a:noFill/>
+            </p:spPr>
+            <p:txBody>
+              <a:bodyPr wrap="none" rtlCol="0">
+                <a:spAutoFit/>
+              </a:bodyPr>
+              <a:lstStyle/>
+              <a:p>
+                <a14:m>
+                  <m:oMathPara xmlns:m="http://schemas.openxmlformats.org/officeDocument/2006/math">
+                    <m:oMathParaPr>
+                      <m:jc m:val="centerGroup"/>
+                    </m:oMathParaPr>
+                    <m:oMath xmlns:m="http://schemas.openxmlformats.org/officeDocument/2006/math">
+                      <m:r>
+                        <a:rPr lang="en-US" sz="1000" i="1" smtClean="0">
+                          <a:latin typeface="Cambria Math" panose="02040503050406030204" pitchFamily="18" charset="0"/>
+                        </a:rPr>
+                        <m:t>⋯</m:t>
+                      </m:r>
+                    </m:oMath>
+                  </m:oMathPara>
+                </a14:m>
+                <a:endParaRPr lang="en-US" sz="1000" dirty="0"/>
+              </a:p>
+            </p:txBody>
+          </p:sp>
+        </mc:Choice>
+        <mc:Fallback>
+          <p:sp>
+            <p:nvSpPr>
+              <p:cNvPr id="56" name="TextBox 55">
+                <a:extLst>
+                  <a:ext uri="{FF2B5EF4-FFF2-40B4-BE49-F238E27FC236}">
+                    <a16:creationId xmlns:a16="http://schemas.microsoft.com/office/drawing/2014/main" id="{57504CEF-B514-3C42-0AE0-9ECAED402709}"/>
+                  </a:ext>
+                </a:extLst>
+              </p:cNvPr>
+              <p:cNvSpPr txBox="1">
+                <a:spLocks noRot="1" noChangeAspect="1" noMove="1" noResize="1" noEditPoints="1" noAdjustHandles="1" noChangeArrowheads="1" noChangeShapeType="1" noTextEdit="1"/>
+              </p:cNvSpPr>
+              <p:nvPr/>
+            </p:nvSpPr>
+            <p:spPr>
+              <a:xfrm>
+                <a:off x="6554838" y="4317917"/>
+                <a:ext cx="324128" cy="246221"/>
+              </a:xfrm>
+              <a:prstGeom prst="rect">
+                <a:avLst/>
+              </a:prstGeom>
+              <a:blipFill>
+                <a:blip r:embed="rId11"/>
+                <a:stretch>
+                  <a:fillRect/>
+                </a:stretch>
+              </a:blipFill>
+            </p:spPr>
+            <p:txBody>
+              <a:bodyPr/>
+              <a:lstStyle/>
+              <a:p>
+                <a:r>
+                  <a:rPr lang="en-US">
+                    <a:noFill/>
+                  </a:rPr>
+                  <a:t> </a:t>
+                </a:r>
+              </a:p>
+            </p:txBody>
+          </p:sp>
+        </mc:Fallback>
+      </mc:AlternateContent>
+      <mc:AlternateContent xmlns:mc="http://schemas.openxmlformats.org/markup-compatibility/2006">
+        <mc:Choice xmlns:a14="http://schemas.microsoft.com/office/drawing/2010/main" Requires="a14">
+          <p:sp>
+            <p:nvSpPr>
+              <p:cNvPr id="57" name="TextBox 56">
+                <a:extLst>
+                  <a:ext uri="{FF2B5EF4-FFF2-40B4-BE49-F238E27FC236}">
+                    <a16:creationId xmlns:a16="http://schemas.microsoft.com/office/drawing/2014/main" id="{E0D0D17D-00E7-FE5B-B675-1ECE14517E94}"/>
+                  </a:ext>
+                </a:extLst>
+              </p:cNvPr>
+              <p:cNvSpPr txBox="1"/>
+              <p:nvPr/>
+            </p:nvSpPr>
+            <p:spPr>
+              <a:xfrm>
+                <a:off x="7425647" y="4324618"/>
+                <a:ext cx="324128" cy="246221"/>
+              </a:xfrm>
+              <a:prstGeom prst="rect">
+                <a:avLst/>
+              </a:prstGeom>
+              <a:noFill/>
+            </p:spPr>
+            <p:txBody>
+              <a:bodyPr wrap="none" rtlCol="0">
+                <a:spAutoFit/>
+              </a:bodyPr>
+              <a:lstStyle/>
+              <a:p>
+                <a14:m>
+                  <m:oMathPara xmlns:m="http://schemas.openxmlformats.org/officeDocument/2006/math">
+                    <m:oMathParaPr>
+                      <m:jc m:val="centerGroup"/>
+                    </m:oMathParaPr>
+                    <m:oMath xmlns:m="http://schemas.openxmlformats.org/officeDocument/2006/math">
+                      <m:r>
+                        <a:rPr lang="en-US" sz="1000" i="1" smtClean="0">
+                          <a:latin typeface="Cambria Math" panose="02040503050406030204" pitchFamily="18" charset="0"/>
+                        </a:rPr>
+                        <m:t>⋯</m:t>
+                      </m:r>
+                    </m:oMath>
+                  </m:oMathPara>
+                </a14:m>
+                <a:endParaRPr lang="en-US" sz="1000" dirty="0"/>
+              </a:p>
+            </p:txBody>
+          </p:sp>
+        </mc:Choice>
+        <mc:Fallback>
+          <p:sp>
+            <p:nvSpPr>
+              <p:cNvPr id="57" name="TextBox 56">
+                <a:extLst>
+                  <a:ext uri="{FF2B5EF4-FFF2-40B4-BE49-F238E27FC236}">
+                    <a16:creationId xmlns:a16="http://schemas.microsoft.com/office/drawing/2014/main" id="{E0D0D17D-00E7-FE5B-B675-1ECE14517E94}"/>
+                  </a:ext>
+                </a:extLst>
+              </p:cNvPr>
+              <p:cNvSpPr txBox="1">
+                <a:spLocks noRot="1" noChangeAspect="1" noMove="1" noResize="1" noEditPoints="1" noAdjustHandles="1" noChangeArrowheads="1" noChangeShapeType="1" noTextEdit="1"/>
+              </p:cNvSpPr>
+              <p:nvPr/>
+            </p:nvSpPr>
+            <p:spPr>
+              <a:xfrm>
+                <a:off x="7425647" y="4324618"/>
+                <a:ext cx="324128" cy="246221"/>
+              </a:xfrm>
+              <a:prstGeom prst="rect">
+                <a:avLst/>
+              </a:prstGeom>
+              <a:blipFill>
+                <a:blip r:embed="rId10"/>
+                <a:stretch>
+                  <a:fillRect/>
+                </a:stretch>
+              </a:blipFill>
+            </p:spPr>
+            <p:txBody>
+              <a:bodyPr/>
+              <a:lstStyle/>
+              <a:p>
+                <a:r>
+                  <a:rPr lang="en-US">
+                    <a:noFill/>
+                  </a:rPr>
+                  <a:t> </a:t>
+                </a:r>
+              </a:p>
+            </p:txBody>
+          </p:sp>
+        </mc:Fallback>
+      </mc:AlternateContent>
+      <mc:AlternateContent xmlns:mc="http://schemas.openxmlformats.org/markup-compatibility/2006">
+        <mc:Choice xmlns:a14="http://schemas.microsoft.com/office/drawing/2010/main" Requires="a14">
+          <p:sp>
+            <p:nvSpPr>
+              <p:cNvPr id="58" name="TextBox 57">
+                <a:extLst>
+                  <a:ext uri="{FF2B5EF4-FFF2-40B4-BE49-F238E27FC236}">
+                    <a16:creationId xmlns:a16="http://schemas.microsoft.com/office/drawing/2014/main" id="{2F511F0A-AE40-AF8A-D7C1-8917F5FC5519}"/>
+                  </a:ext>
+                </a:extLst>
+              </p:cNvPr>
+              <p:cNvSpPr txBox="1"/>
+              <p:nvPr/>
+            </p:nvSpPr>
+            <p:spPr>
+              <a:xfrm>
+                <a:off x="6380716" y="4117211"/>
+                <a:ext cx="734945" cy="230832"/>
+              </a:xfrm>
+              <a:prstGeom prst="rect">
+                <a:avLst/>
+              </a:prstGeom>
+              <a:noFill/>
+            </p:spPr>
+            <p:txBody>
+              <a:bodyPr wrap="none" rtlCol="0">
+                <a:spAutoFit/>
+              </a:bodyPr>
+              <a:lstStyle/>
+              <a:p>
+                <a14:m>
+                  <m:oMathPara xmlns:m="http://schemas.openxmlformats.org/officeDocument/2006/math">
+                    <m:oMathParaPr>
+                      <m:jc m:val="centerGroup"/>
+                    </m:oMathParaPr>
+                    <m:oMath xmlns:m="http://schemas.openxmlformats.org/officeDocument/2006/math">
+                      <m:r>
+                        <a:rPr lang="en-US" sz="900" i="1" dirty="0" smtClean="0">
+                          <a:latin typeface="Cambria Math" panose="02040503050406030204" pitchFamily="18" charset="0"/>
+                        </a:rPr>
+                        <m:t>𝑞</m:t>
+                      </m:r>
+                      <m:d>
+                        <m:dPr>
+                          <m:ctrlPr>
+                            <a:rPr lang="en-US" sz="900" i="1" dirty="0" smtClean="0">
+                              <a:latin typeface="Cambria Math" panose="02040503050406030204" pitchFamily="18" charset="0"/>
+                            </a:rPr>
+                          </m:ctrlPr>
+                        </m:dPr>
+                        <m:e>
+                          <m:sSub>
+                            <m:sSubPr>
+                              <m:ctrlPr>
+                                <a:rPr lang="en-US" sz="900" i="1" dirty="0" smtClean="0">
+                                  <a:latin typeface="Cambria Math" panose="02040503050406030204" pitchFamily="18" charset="0"/>
+                                </a:rPr>
+                              </m:ctrlPr>
+                            </m:sSubPr>
+                            <m:e>
+                              <m:r>
+                                <a:rPr lang="en-US" sz="900" b="1" i="0" dirty="0" smtClean="0">
+                                  <a:latin typeface="Cambria Math" panose="02040503050406030204" pitchFamily="18" charset="0"/>
+                                </a:rPr>
+                                <m:t>𝐱</m:t>
+                              </m:r>
+                            </m:e>
+                            <m:sub>
+                              <m:r>
+                                <a:rPr lang="en-US" sz="900" b="0" i="1" dirty="0" smtClean="0">
+                                  <a:latin typeface="Cambria Math" panose="02040503050406030204" pitchFamily="18" charset="0"/>
+                                </a:rPr>
+                                <m:t>𝑡</m:t>
+                              </m:r>
+                              <m:r>
+                                <a:rPr lang="en-US" sz="900" b="0" i="1" dirty="0" smtClean="0">
+                                  <a:latin typeface="Cambria Math" panose="02040503050406030204" pitchFamily="18" charset="0"/>
+                                </a:rPr>
+                                <m:t>−1</m:t>
+                              </m:r>
+                            </m:sub>
+                          </m:sSub>
+                          <m:r>
+                            <a:rPr lang="en-US" sz="900" b="0" i="1" dirty="0" smtClean="0">
+                              <a:latin typeface="Cambria Math" panose="02040503050406030204" pitchFamily="18" charset="0"/>
+                            </a:rPr>
+                            <m:t>|</m:t>
+                          </m:r>
+                          <m:sSub>
+                            <m:sSubPr>
+                              <m:ctrlPr>
+                                <a:rPr lang="en-US" sz="900" b="0" i="1" dirty="0" smtClean="0">
+                                  <a:latin typeface="Cambria Math" panose="02040503050406030204" pitchFamily="18" charset="0"/>
+                                </a:rPr>
+                              </m:ctrlPr>
+                            </m:sSubPr>
+                            <m:e>
+                              <m:r>
+                                <a:rPr lang="en-US" sz="900" b="1" i="0" dirty="0" smtClean="0">
+                                  <a:latin typeface="Cambria Math" panose="02040503050406030204" pitchFamily="18" charset="0"/>
+                                </a:rPr>
+                                <m:t>𝐱</m:t>
+                              </m:r>
+                            </m:e>
+                            <m:sub>
+                              <m:r>
+                                <a:rPr lang="en-US" sz="900" b="0" i="1" dirty="0" smtClean="0">
+                                  <a:latin typeface="Cambria Math" panose="02040503050406030204" pitchFamily="18" charset="0"/>
+                                </a:rPr>
+                                <m:t>𝑡</m:t>
+                              </m:r>
+                            </m:sub>
+                          </m:sSub>
+                        </m:e>
+                      </m:d>
+                    </m:oMath>
+                  </m:oMathPara>
+                </a14:m>
+                <a:endParaRPr lang="en-US" sz="900" dirty="0"/>
+              </a:p>
+            </p:txBody>
+          </p:sp>
+        </mc:Choice>
+        <mc:Fallback>
+          <p:sp>
+            <p:nvSpPr>
+              <p:cNvPr id="58" name="TextBox 57">
+                <a:extLst>
+                  <a:ext uri="{FF2B5EF4-FFF2-40B4-BE49-F238E27FC236}">
+                    <a16:creationId xmlns:a16="http://schemas.microsoft.com/office/drawing/2014/main" id="{2F511F0A-AE40-AF8A-D7C1-8917F5FC5519}"/>
+                  </a:ext>
+                </a:extLst>
+              </p:cNvPr>
+              <p:cNvSpPr txBox="1">
+                <a:spLocks noRot="1" noChangeAspect="1" noMove="1" noResize="1" noEditPoints="1" noAdjustHandles="1" noChangeArrowheads="1" noChangeShapeType="1" noTextEdit="1"/>
+              </p:cNvSpPr>
+              <p:nvPr/>
+            </p:nvSpPr>
+            <p:spPr>
+              <a:xfrm>
+                <a:off x="6380716" y="4117211"/>
+                <a:ext cx="734945" cy="230832"/>
+              </a:xfrm>
+              <a:prstGeom prst="rect">
+                <a:avLst/>
+              </a:prstGeom>
+              <a:blipFill>
+                <a:blip r:embed="rId17"/>
+                <a:stretch>
+                  <a:fillRect/>
+                </a:stretch>
+              </a:blipFill>
+            </p:spPr>
+            <p:txBody>
+              <a:bodyPr/>
+              <a:lstStyle/>
+              <a:p>
+                <a:r>
+                  <a:rPr lang="en-US">
+                    <a:noFill/>
+                  </a:rPr>
+                  <a:t> </a:t>
+                </a:r>
+              </a:p>
+            </p:txBody>
+          </p:sp>
+        </mc:Fallback>
+      </mc:AlternateContent>
+      <mc:AlternateContent xmlns:mc="http://schemas.openxmlformats.org/markup-compatibility/2006">
+        <mc:Choice xmlns:a14="http://schemas.microsoft.com/office/drawing/2010/main" Requires="a14">
+          <p:sp>
+            <p:nvSpPr>
+              <p:cNvPr id="59" name="TextBox 58">
+                <a:extLst>
+                  <a:ext uri="{FF2B5EF4-FFF2-40B4-BE49-F238E27FC236}">
+                    <a16:creationId xmlns:a16="http://schemas.microsoft.com/office/drawing/2014/main" id="{A0F2EA5D-C148-72A5-905B-B5EDDE0003DA}"/>
+                  </a:ext>
+                </a:extLst>
+              </p:cNvPr>
+              <p:cNvSpPr txBox="1"/>
+              <p:nvPr/>
+            </p:nvSpPr>
+            <p:spPr>
+              <a:xfrm>
+                <a:off x="6395825" y="4785599"/>
+                <a:ext cx="734945" cy="230832"/>
+              </a:xfrm>
+              <a:prstGeom prst="rect">
+                <a:avLst/>
+              </a:prstGeom>
+              <a:noFill/>
+            </p:spPr>
+            <p:txBody>
+              <a:bodyPr wrap="none" rtlCol="0">
+                <a:spAutoFit/>
+              </a:bodyPr>
+              <a:lstStyle/>
+              <a:p>
+                <a14:m>
+                  <m:oMathPara xmlns:m="http://schemas.openxmlformats.org/officeDocument/2006/math">
+                    <m:oMathParaPr>
+                      <m:jc m:val="centerGroup"/>
+                    </m:oMathParaPr>
+                    <m:oMath xmlns:m="http://schemas.openxmlformats.org/officeDocument/2006/math">
+                      <m:r>
+                        <a:rPr lang="en-US" sz="900" i="1" dirty="0" smtClean="0">
+                          <a:latin typeface="Cambria Math" panose="02040503050406030204" pitchFamily="18" charset="0"/>
+                        </a:rPr>
+                        <m:t>𝑞</m:t>
+                      </m:r>
+                      <m:d>
+                        <m:dPr>
+                          <m:ctrlPr>
+                            <a:rPr lang="en-US" sz="900" i="1" dirty="0" smtClean="0">
+                              <a:latin typeface="Cambria Math" panose="02040503050406030204" pitchFamily="18" charset="0"/>
+                            </a:rPr>
+                          </m:ctrlPr>
+                        </m:dPr>
+                        <m:e>
+                          <m:sSub>
+                            <m:sSubPr>
+                              <m:ctrlPr>
+                                <a:rPr lang="en-US" sz="900" i="1" dirty="0" smtClean="0">
+                                  <a:latin typeface="Cambria Math" panose="02040503050406030204" pitchFamily="18" charset="0"/>
+                                </a:rPr>
+                              </m:ctrlPr>
+                            </m:sSubPr>
+                            <m:e>
+                              <m:r>
+                                <a:rPr lang="en-US" sz="900" b="1" i="0" dirty="0" smtClean="0">
+                                  <a:latin typeface="Cambria Math" panose="02040503050406030204" pitchFamily="18" charset="0"/>
+                                </a:rPr>
+                                <m:t>𝐱</m:t>
+                              </m:r>
+                            </m:e>
+                            <m:sub>
+                              <m:r>
+                                <a:rPr lang="en-US" sz="900" b="0" i="1" dirty="0" smtClean="0">
+                                  <a:latin typeface="Cambria Math" panose="02040503050406030204" pitchFamily="18" charset="0"/>
+                                </a:rPr>
+                                <m:t>𝑡</m:t>
+                              </m:r>
+                            </m:sub>
+                          </m:sSub>
+                          <m:r>
+                            <a:rPr lang="en-US" sz="900" b="0" i="1" dirty="0" smtClean="0">
+                              <a:latin typeface="Cambria Math" panose="02040503050406030204" pitchFamily="18" charset="0"/>
+                            </a:rPr>
+                            <m:t>|</m:t>
+                          </m:r>
+                          <m:sSub>
+                            <m:sSubPr>
+                              <m:ctrlPr>
+                                <a:rPr lang="en-US" sz="900" b="0" i="1" dirty="0" smtClean="0">
+                                  <a:latin typeface="Cambria Math" panose="02040503050406030204" pitchFamily="18" charset="0"/>
+                                </a:rPr>
+                              </m:ctrlPr>
+                            </m:sSubPr>
+                            <m:e>
+                              <m:r>
+                                <a:rPr lang="en-US" sz="900" b="1" i="0" dirty="0" smtClean="0">
+                                  <a:latin typeface="Cambria Math" panose="02040503050406030204" pitchFamily="18" charset="0"/>
+                                </a:rPr>
+                                <m:t>𝐱</m:t>
+                              </m:r>
+                            </m:e>
+                            <m:sub>
+                              <m:r>
+                                <a:rPr lang="en-US" sz="900" b="0" i="1" dirty="0" smtClean="0">
+                                  <a:latin typeface="Cambria Math" panose="02040503050406030204" pitchFamily="18" charset="0"/>
+                                </a:rPr>
+                                <m:t>𝑡</m:t>
+                              </m:r>
+                              <m:r>
+                                <a:rPr lang="en-US" sz="900" b="0" i="1" dirty="0" smtClean="0">
+                                  <a:latin typeface="Cambria Math" panose="02040503050406030204" pitchFamily="18" charset="0"/>
+                                </a:rPr>
+                                <m:t>−1</m:t>
+                              </m:r>
+                            </m:sub>
+                          </m:sSub>
+                        </m:e>
+                      </m:d>
+                    </m:oMath>
+                  </m:oMathPara>
+                </a14:m>
+                <a:endParaRPr lang="en-US" sz="900" dirty="0"/>
+              </a:p>
+            </p:txBody>
+          </p:sp>
+        </mc:Choice>
+        <mc:Fallback>
+          <p:sp>
+            <p:nvSpPr>
+              <p:cNvPr id="59" name="TextBox 58">
+                <a:extLst>
+                  <a:ext uri="{FF2B5EF4-FFF2-40B4-BE49-F238E27FC236}">
+                    <a16:creationId xmlns:a16="http://schemas.microsoft.com/office/drawing/2014/main" id="{A0F2EA5D-C148-72A5-905B-B5EDDE0003DA}"/>
+                  </a:ext>
+                </a:extLst>
+              </p:cNvPr>
+              <p:cNvSpPr txBox="1">
+                <a:spLocks noRot="1" noChangeAspect="1" noMove="1" noResize="1" noEditPoints="1" noAdjustHandles="1" noChangeArrowheads="1" noChangeShapeType="1" noTextEdit="1"/>
+              </p:cNvSpPr>
+              <p:nvPr/>
+            </p:nvSpPr>
+            <p:spPr>
+              <a:xfrm>
+                <a:off x="6395825" y="4785599"/>
+                <a:ext cx="734945" cy="230832"/>
+              </a:xfrm>
+              <a:prstGeom prst="rect">
+                <a:avLst/>
+              </a:prstGeom>
+              <a:blipFill>
+                <a:blip r:embed="rId18"/>
+                <a:stretch>
+                  <a:fillRect/>
+                </a:stretch>
+              </a:blipFill>
+            </p:spPr>
+            <p:txBody>
+              <a:bodyPr/>
+              <a:lstStyle/>
+              <a:p>
+                <a:r>
+                  <a:rPr lang="en-US">
+                    <a:noFill/>
+                  </a:rPr>
+                  <a:t> </a:t>
+                </a:r>
+              </a:p>
+            </p:txBody>
+          </p:sp>
+        </mc:Fallback>
+      </mc:AlternateContent>
     </p:spTree>
     <p:extLst>
       <p:ext uri="{BB962C8B-B14F-4D97-AF65-F5344CB8AC3E}">

</xml_diff>